<commit_message>
completed the administrative simplification slides
</commit_message>
<xml_diff>
--- a/PowerPoints/Phase 2/010 Administrative Simplification.pptx
+++ b/PowerPoints/Phase 2/010 Administrative Simplification.pptx
@@ -9,8 +9,8 @@
     <p:sldId id="256" r:id="rId3"/>
     <p:sldId id="257" r:id="rId4"/>
     <p:sldId id="258" r:id="rId5"/>
-    <p:sldId id="259" r:id="rId6"/>
-    <p:sldId id="260" r:id="rId7"/>
+    <p:sldId id="260" r:id="rId6"/>
+    <p:sldId id="259" r:id="rId7"/>
     <p:sldId id="261" r:id="rId8"/>
   </p:sldIdLst>
   <p:sldSz cx="12192000" cy="6858000"/>
@@ -1678,7 +1678,7 @@
   </p:clrMapOvr>
   <p:extLst>
     <p:ext uri="{DCECCB84-F9BA-43D5-87BE-67443E8EF086}">
-      <p15:sldGuideLst xmlns="" xmlns:p15="http://schemas.microsoft.com/office/powerpoint/2012/main"/>
+      <p15:sldGuideLst xmlns:p15="http://schemas.microsoft.com/office/powerpoint/2012/main" xmlns=""/>
     </p:ext>
   </p:extLst>
 </p:sldLayout>
@@ -2105,7 +2105,7 @@
   </p:clrMapOvr>
   <p:extLst>
     <p:ext uri="{DCECCB84-F9BA-43D5-87BE-67443E8EF086}">
-      <p15:sldGuideLst xmlns="" xmlns:p15="http://schemas.microsoft.com/office/powerpoint/2012/main"/>
+      <p15:sldGuideLst xmlns:p15="http://schemas.microsoft.com/office/powerpoint/2012/main" xmlns=""/>
     </p:ext>
   </p:extLst>
 </p:sldLayout>
@@ -2648,7 +2648,7 @@
   </p:clrMapOvr>
   <p:extLst>
     <p:ext uri="{DCECCB84-F9BA-43D5-87BE-67443E8EF086}">
-      <p15:sldGuideLst xmlns="" xmlns:p15="http://schemas.microsoft.com/office/powerpoint/2012/main"/>
+      <p15:sldGuideLst xmlns:p15="http://schemas.microsoft.com/office/powerpoint/2012/main" xmlns=""/>
     </p:ext>
   </p:extLst>
 </p:sldLayout>
@@ -4194,7 +4194,7 @@
   </p:clrMapOvr>
   <p:extLst>
     <p:ext uri="{DCECCB84-F9BA-43D5-87BE-67443E8EF086}">
-      <p15:sldGuideLst xmlns="" xmlns:p15="http://schemas.microsoft.com/office/powerpoint/2012/main"/>
+      <p15:sldGuideLst xmlns:p15="http://schemas.microsoft.com/office/powerpoint/2012/main" xmlns=""/>
     </p:ext>
   </p:extLst>
 </p:sldLayout>
@@ -4569,7 +4569,7 @@
   </p:clrMapOvr>
   <p:extLst>
     <p:ext uri="{DCECCB84-F9BA-43D5-87BE-67443E8EF086}">
-      <p15:sldGuideLst xmlns="" xmlns:p15="http://schemas.microsoft.com/office/powerpoint/2012/main"/>
+      <p15:sldGuideLst xmlns:p15="http://schemas.microsoft.com/office/powerpoint/2012/main" xmlns=""/>
     </p:ext>
   </p:extLst>
 </p:sldLayout>
@@ -5071,7 +5071,7 @@
   </p:clrMapOvr>
   <p:extLst>
     <p:ext uri="{DCECCB84-F9BA-43D5-87BE-67443E8EF086}">
-      <p15:sldGuideLst xmlns="" xmlns:p15="http://schemas.microsoft.com/office/powerpoint/2012/main"/>
+      <p15:sldGuideLst xmlns:p15="http://schemas.microsoft.com/office/powerpoint/2012/main" xmlns=""/>
     </p:ext>
   </p:extLst>
 </p:sldLayout>
@@ -5870,7 +5870,7 @@
   </p:txStyles>
   <p:extLst>
     <p:ext uri="{27BBF7A9-308A-43DC-89C8-2F10F3537804}">
-      <p15:sldGuideLst xmlns="" xmlns:p15="http://schemas.microsoft.com/office/powerpoint/2012/main"/>
+      <p15:sldGuideLst xmlns:p15="http://schemas.microsoft.com/office/powerpoint/2012/main" xmlns=""/>
     </p:ext>
   </p:extLst>
 </p:sldMaster>
@@ -6567,7 +6567,7 @@
   </p:txStyles>
   <p:extLst>
     <p:ext uri="{27BBF7A9-308A-43DC-89C8-2F10F3537804}">
-      <p15:sldGuideLst xmlns="" xmlns:p15="http://schemas.microsoft.com/office/powerpoint/2012/main"/>
+      <p15:sldGuideLst xmlns:p15="http://schemas.microsoft.com/office/powerpoint/2012/main" xmlns=""/>
     </p:ext>
   </p:extLst>
 </p:sldMaster>
@@ -6681,7 +6681,11 @@
           <a:bodyPr/>
           <a:lstStyle/>
           <a:p>
-            <a:endParaRPr lang="en-US"/>
+            <a:r>
+              <a:rPr lang="en-US" dirty="0" smtClean="0"/>
+              <a:t>What is Administrative Simplification?</a:t>
+            </a:r>
+            <a:endParaRPr lang="en-US" dirty="0"/>
           </a:p>
         </p:txBody>
       </p:sp>
@@ -6695,11 +6699,54 @@
             <p:ph idx="1"/>
           </p:nvPr>
         </p:nvSpPr>
-        <p:spPr/>
-        <p:txBody>
-          <a:bodyPr/>
-          <a:lstStyle/>
-          <a:p>
+        <p:spPr>
+          <a:xfrm>
+            <a:off x="1534696" y="2015732"/>
+            <a:ext cx="8903848" cy="3953553"/>
+          </a:xfrm>
+        </p:spPr>
+        <p:txBody>
+          <a:bodyPr/>
+          <a:lstStyle/>
+          <a:p>
+            <a:r>
+              <a:rPr lang="en-US" dirty="0" smtClean="0"/>
+              <a:t>Many state agencies require data from health insurance organizations:</a:t>
+            </a:r>
+          </a:p>
+          <a:p>
+            <a:pPr lvl="1"/>
+            <a:r>
+              <a:rPr lang="en-US" dirty="0" smtClean="0"/>
+              <a:t>The Department of Insurance: Uses membership and claim data to regulate the industry.</a:t>
+            </a:r>
+          </a:p>
+          <a:p>
+            <a:pPr lvl="1"/>
+            <a:r>
+              <a:rPr lang="en-US" dirty="0" smtClean="0"/>
+              <a:t>The Group Insurance Commission: Uses claims data to develop provider tiers for the state government’s employee health plan.</a:t>
+            </a:r>
+          </a:p>
+          <a:p>
+            <a:pPr lvl="1"/>
+            <a:r>
+              <a:rPr lang="en-US" dirty="0" smtClean="0"/>
+              <a:t>Health Policy Commission: Conducts policy research.</a:t>
+            </a:r>
+          </a:p>
+          <a:p>
+            <a:pPr lvl="1"/>
+            <a:r>
+              <a:rPr lang="en-US" dirty="0" smtClean="0"/>
+              <a:t>Department of Public Health:  Monitoring public health initiatives.</a:t>
+            </a:r>
+          </a:p>
+          <a:p>
+            <a:r>
+              <a:rPr lang="en-US" dirty="0" smtClean="0"/>
+              <a:t>Administrative Simplification reduces regulatory compliance costs for insurance organizations by helping government agencies use the APCD to meet their data needs.</a:t>
+            </a:r>
             <a:endParaRPr lang="en-US" dirty="0"/>
           </a:p>
         </p:txBody>
@@ -6749,7 +6796,11 @@
           <a:bodyPr/>
           <a:lstStyle/>
           <a:p>
-            <a:endParaRPr lang="en-US"/>
+            <a:r>
+              <a:rPr lang="en-US" dirty="0" smtClean="0"/>
+              <a:t>Example – Merged Market Risk Adjustment</a:t>
+            </a:r>
+            <a:endParaRPr lang="en-US" dirty="0"/>
           </a:p>
         </p:txBody>
       </p:sp>
@@ -6768,6 +6819,22 @@
           <a:bodyPr/>
           <a:lstStyle/>
           <a:p>
+            <a:r>
+              <a:rPr lang="en-US" dirty="0" smtClean="0"/>
+              <a:t>Under the ACA, premiums are transferred from insurance companies with healthy populations to those companies that insure sicker patient.  This process is known as Risk Adjustment.</a:t>
+            </a:r>
+          </a:p>
+          <a:p>
+            <a:r>
+              <a:rPr lang="en-US" dirty="0" smtClean="0"/>
+              <a:t>The health of individual patients is estimated by analyzing their recent medical history.  This estimate of the patient’s health is know as their Risk Score.</a:t>
+            </a:r>
+          </a:p>
+          <a:p>
+            <a:r>
+              <a:rPr lang="en-US" dirty="0" smtClean="0"/>
+              <a:t>In Massachusetts, data for the risk score calculation was extracted from the APCD.  </a:t>
+            </a:r>
             <a:endParaRPr lang="en-US" dirty="0"/>
           </a:p>
         </p:txBody>
@@ -6817,7 +6884,11 @@
           <a:bodyPr/>
           <a:lstStyle/>
           <a:p>
-            <a:endParaRPr lang="en-US"/>
+            <a:r>
+              <a:rPr lang="en-US" dirty="0" smtClean="0"/>
+              <a:t>Example – DOI Membership Reporting</a:t>
+            </a:r>
+            <a:endParaRPr lang="en-US" dirty="0"/>
           </a:p>
         </p:txBody>
       </p:sp>
@@ -6835,6 +6906,18 @@
         <p:txBody>
           <a:bodyPr/>
           <a:lstStyle/>
+          <a:p>
+            <a:r>
+              <a:rPr lang="en-US" dirty="0" smtClean="0"/>
+              <a:t>In Massachusetts, health insurance organizations are required to submit quarterly membership reports to the Department of Insurance.</a:t>
+            </a:r>
+          </a:p>
+          <a:p>
+            <a:r>
+              <a:rPr lang="en-US" dirty="0" smtClean="0"/>
+              <a:t>In 2016, these reports were redesigned to use data from the APCD.</a:t>
+            </a:r>
+          </a:p>
           <a:p>
             <a:endParaRPr lang="en-US" dirty="0"/>
           </a:p>
@@ -6885,7 +6968,15 @@
           <a:bodyPr/>
           <a:lstStyle/>
           <a:p>
-            <a:endParaRPr lang="en-US"/>
+            <a:r>
+              <a:rPr lang="en-US" dirty="0" smtClean="0"/>
+              <a:t>Example – GIC </a:t>
+            </a:r>
+            <a:r>
+              <a:rPr lang="en-US" dirty="0" err="1" smtClean="0"/>
+              <a:t>Tiering</a:t>
+            </a:r>
+            <a:endParaRPr lang="en-US" dirty="0"/>
           </a:p>
         </p:txBody>
       </p:sp>
@@ -6904,6 +6995,26 @@
           <a:bodyPr/>
           <a:lstStyle/>
           <a:p>
+            <a:r>
+              <a:rPr lang="en-US" dirty="0" smtClean="0"/>
+              <a:t>The Group Insurance Commission ranks doctors based on the cost and quality of the care they provide.</a:t>
+            </a:r>
+          </a:p>
+          <a:p>
+            <a:r>
+              <a:rPr lang="en-US" dirty="0" smtClean="0"/>
+              <a:t>This ranking process uses detailed claims data.  Historically, </a:t>
+            </a:r>
+            <a:r>
+              <a:rPr lang="en-US" dirty="0" smtClean="0"/>
+              <a:t>this required insurance companies to submit data directly to the GIC.</a:t>
+            </a:r>
+          </a:p>
+          <a:p>
+            <a:r>
+              <a:rPr lang="en-US" dirty="0" smtClean="0"/>
+              <a:t>A project is underway to source this data from the APCD.</a:t>
+            </a:r>
             <a:endParaRPr lang="en-US" dirty="0"/>
           </a:p>
         </p:txBody>
@@ -6953,7 +7064,11 @@
           <a:bodyPr/>
           <a:lstStyle/>
           <a:p>
-            <a:endParaRPr lang="en-US"/>
+            <a:r>
+              <a:rPr lang="en-US" dirty="0" smtClean="0"/>
+              <a:t>References</a:t>
+            </a:r>
+            <a:endParaRPr lang="en-US" dirty="0"/>
           </a:p>
         </p:txBody>
       </p:sp>
@@ -6971,6 +7086,51 @@
         <p:txBody>
           <a:bodyPr/>
           <a:lstStyle/>
+          <a:p>
+            <a:r>
+              <a:rPr lang="en-US" dirty="0">
+                <a:hlinkClick r:id="rId2"/>
+              </a:rPr>
+              <a:t>http://</a:t>
+            </a:r>
+            <a:r>
+              <a:rPr lang="en-US" dirty="0" smtClean="0">
+                <a:hlinkClick r:id="rId2"/>
+              </a:rPr>
+              <a:t>www.chiamass.gov/government-agency-apcd-requests</a:t>
+            </a:r>
+            <a:endParaRPr lang="en-US" dirty="0" smtClean="0"/>
+          </a:p>
+          <a:p>
+            <a:r>
+              <a:rPr lang="en-US" dirty="0">
+                <a:hlinkClick r:id="rId3"/>
+              </a:rPr>
+              <a:t>http://</a:t>
+            </a:r>
+            <a:r>
+              <a:rPr lang="en-US" dirty="0" smtClean="0">
+                <a:hlinkClick r:id="rId3"/>
+              </a:rPr>
+              <a:t>www.mass.gov/anf/employee-insurance-and-retirement-benefits/oversight-agencies/gic/what-is-the-gic.html</a:t>
+            </a:r>
+            <a:endParaRPr lang="en-US" dirty="0" smtClean="0"/>
+          </a:p>
+          <a:p>
+            <a:r>
+              <a:rPr lang="en-US" dirty="0">
+                <a:hlinkClick r:id="rId4"/>
+              </a:rPr>
+              <a:t>https://</a:t>
+            </a:r>
+            <a:r>
+              <a:rPr lang="en-US" dirty="0" smtClean="0">
+                <a:hlinkClick r:id="rId4"/>
+              </a:rPr>
+              <a:t>betterhealthconnector.com/wp-content/uploads/board_meetings/2015/2015-07-09/Board-Memo-Risk-Adjustment-Update-070615.pdf</a:t>
+            </a:r>
+            <a:endParaRPr lang="en-US" dirty="0" smtClean="0"/>
+          </a:p>
           <a:p>
             <a:endParaRPr lang="en-US" dirty="0"/>
           </a:p>
@@ -7489,7 +7649,7 @@
   <a:extraClrSchemeLst/>
   <a:extLst>
     <a:ext uri="{05A4C25C-085E-4340-85A3-A5531E510DB2}">
-      <thm15:themeFamily xmlns="" xmlns:thm15="http://schemas.microsoft.com/office/thememl/2012/main" name="Gallery" id="{BBFCD31E-59A1-489D-B089-A3EAD7CAE12E}" vid="{AC464412-510E-4F2B-8947-A0DDBD028997}"/>
+      <thm15:themeFamily xmlns:thm15="http://schemas.microsoft.com/office/thememl/2012/main" xmlns="" name="Gallery" id="{BBFCD31E-59A1-489D-B089-A3EAD7CAE12E}" vid="{AC464412-510E-4F2B-8947-A0DDBD028997}"/>
     </a:ext>
   </a:extLst>
 </a:theme>

</xml_diff>

<commit_message>
added a reference to the administrative simplification slides
</commit_message>
<xml_diff>
--- a/PowerPoints/Phase 2/010 Administrative Simplification.pptx
+++ b/PowerPoints/Phase 2/010 Administrative Simplification.pptx
@@ -1678,7 +1678,7 @@
   </p:clrMapOvr>
   <p:extLst>
     <p:ext uri="{DCECCB84-F9BA-43D5-87BE-67443E8EF086}">
-      <p15:sldGuideLst xmlns:p15="http://schemas.microsoft.com/office/powerpoint/2012/main" xmlns=""/>
+      <p15:sldGuideLst xmlns="" xmlns:p15="http://schemas.microsoft.com/office/powerpoint/2012/main"/>
     </p:ext>
   </p:extLst>
 </p:sldLayout>
@@ -2105,7 +2105,7 @@
   </p:clrMapOvr>
   <p:extLst>
     <p:ext uri="{DCECCB84-F9BA-43D5-87BE-67443E8EF086}">
-      <p15:sldGuideLst xmlns:p15="http://schemas.microsoft.com/office/powerpoint/2012/main" xmlns=""/>
+      <p15:sldGuideLst xmlns="" xmlns:p15="http://schemas.microsoft.com/office/powerpoint/2012/main"/>
     </p:ext>
   </p:extLst>
 </p:sldLayout>
@@ -2648,7 +2648,7 @@
   </p:clrMapOvr>
   <p:extLst>
     <p:ext uri="{DCECCB84-F9BA-43D5-87BE-67443E8EF086}">
-      <p15:sldGuideLst xmlns:p15="http://schemas.microsoft.com/office/powerpoint/2012/main" xmlns=""/>
+      <p15:sldGuideLst xmlns="" xmlns:p15="http://schemas.microsoft.com/office/powerpoint/2012/main"/>
     </p:ext>
   </p:extLst>
 </p:sldLayout>
@@ -4194,7 +4194,7 @@
   </p:clrMapOvr>
   <p:extLst>
     <p:ext uri="{DCECCB84-F9BA-43D5-87BE-67443E8EF086}">
-      <p15:sldGuideLst xmlns:p15="http://schemas.microsoft.com/office/powerpoint/2012/main" xmlns=""/>
+      <p15:sldGuideLst xmlns="" xmlns:p15="http://schemas.microsoft.com/office/powerpoint/2012/main"/>
     </p:ext>
   </p:extLst>
 </p:sldLayout>
@@ -4569,7 +4569,7 @@
   </p:clrMapOvr>
   <p:extLst>
     <p:ext uri="{DCECCB84-F9BA-43D5-87BE-67443E8EF086}">
-      <p15:sldGuideLst xmlns:p15="http://schemas.microsoft.com/office/powerpoint/2012/main" xmlns=""/>
+      <p15:sldGuideLst xmlns="" xmlns:p15="http://schemas.microsoft.com/office/powerpoint/2012/main"/>
     </p:ext>
   </p:extLst>
 </p:sldLayout>
@@ -5071,7 +5071,7 @@
   </p:clrMapOvr>
   <p:extLst>
     <p:ext uri="{DCECCB84-F9BA-43D5-87BE-67443E8EF086}">
-      <p15:sldGuideLst xmlns:p15="http://schemas.microsoft.com/office/powerpoint/2012/main" xmlns=""/>
+      <p15:sldGuideLst xmlns="" xmlns:p15="http://schemas.microsoft.com/office/powerpoint/2012/main"/>
     </p:ext>
   </p:extLst>
 </p:sldLayout>
@@ -5870,7 +5870,7 @@
   </p:txStyles>
   <p:extLst>
     <p:ext uri="{27BBF7A9-308A-43DC-89C8-2F10F3537804}">
-      <p15:sldGuideLst xmlns:p15="http://schemas.microsoft.com/office/powerpoint/2012/main" xmlns=""/>
+      <p15:sldGuideLst xmlns="" xmlns:p15="http://schemas.microsoft.com/office/powerpoint/2012/main"/>
     </p:ext>
   </p:extLst>
 </p:sldMaster>
@@ -6567,7 +6567,7 @@
   </p:txStyles>
   <p:extLst>
     <p:ext uri="{27BBF7A9-308A-43DC-89C8-2F10F3537804}">
-      <p15:sldGuideLst xmlns:p15="http://schemas.microsoft.com/office/powerpoint/2012/main" xmlns=""/>
+      <p15:sldGuideLst xmlns="" xmlns:p15="http://schemas.microsoft.com/office/powerpoint/2012/main"/>
     </p:ext>
   </p:extLst>
 </p:sldMaster>
@@ -7003,11 +7003,7 @@
           <a:p>
             <a:r>
               <a:rPr lang="en-US" dirty="0" smtClean="0"/>
-              <a:t>This ranking process uses detailed claims data.  Historically, </a:t>
-            </a:r>
-            <a:r>
-              <a:rPr lang="en-US" dirty="0" smtClean="0"/>
-              <a:t>this required insurance companies to submit data directly to the GIC.</a:t>
+              <a:t>This ranking process uses detailed claims data.  Historically, this required insurance companies to submit data directly to the GIC.</a:t>
             </a:r>
           </a:p>
           <a:p>
@@ -7084,7 +7080,9 @@
         </p:nvSpPr>
         <p:spPr/>
         <p:txBody>
-          <a:bodyPr/>
+          <a:bodyPr>
+            <a:normAutofit/>
+          </a:bodyPr>
           <a:lstStyle/>
           <a:p>
             <a:r>
@@ -7118,14 +7116,35 @@
           </a:p>
           <a:p>
             <a:r>
-              <a:rPr lang="en-US" dirty="0">
+              <a:rPr lang="en-US">
                 <a:hlinkClick r:id="rId4"/>
               </a:rPr>
+              <a:t>http</a:t>
+            </a:r>
+            <a:r>
+              <a:rPr lang="en-US">
+                <a:hlinkClick r:id="rId4"/>
+              </a:rPr>
+              <a:t>://</a:t>
+            </a:r>
+            <a:r>
+              <a:rPr lang="en-US" smtClean="0">
+                <a:hlinkClick r:id="rId4"/>
+              </a:rPr>
+              <a:t>www.fchp.org/providers/resources/gic-tiering.aspx</a:t>
+            </a:r>
+            <a:endParaRPr lang="en-US" dirty="0" smtClean="0"/>
+          </a:p>
+          <a:p>
+            <a:r>
+              <a:rPr lang="en-US" dirty="0">
+                <a:hlinkClick r:id="rId5"/>
+              </a:rPr>
               <a:t>https://</a:t>
             </a:r>
             <a:r>
               <a:rPr lang="en-US" dirty="0" smtClean="0">
-                <a:hlinkClick r:id="rId4"/>
+                <a:hlinkClick r:id="rId5"/>
               </a:rPr>
               <a:t>betterhealthconnector.com/wp-content/uploads/board_meetings/2015/2015-07-09/Board-Memo-Risk-Adjustment-Update-070615.pdf</a:t>
             </a:r>
@@ -7649,7 +7668,7 @@
   <a:extraClrSchemeLst/>
   <a:extLst>
     <a:ext uri="{05A4C25C-085E-4340-85A3-A5531E510DB2}">
-      <thm15:themeFamily xmlns:thm15="http://schemas.microsoft.com/office/thememl/2012/main" xmlns="" name="Gallery" id="{BBFCD31E-59A1-489D-B089-A3EAD7CAE12E}" vid="{AC464412-510E-4F2B-8947-A0DDBD028997}"/>
+      <thm15:themeFamily xmlns="" xmlns:thm15="http://schemas.microsoft.com/office/thememl/2012/main" name="Gallery" id="{BBFCD31E-59A1-489D-B089-A3EAD7CAE12E}" vid="{AC464412-510E-4F2B-8947-A0DDBD028997}"/>
     </a:ext>
   </a:extLst>
 </a:theme>

</xml_diff>